<commit_message>
Add pdf for github repo.
</commit_message>
<xml_diff>
--- a/learn_to_read_an_academic_paper/learn-to-read-an-academic-paper.pptx
+++ b/learn_to_read_an_academic_paper/learn-to-read-an-academic-paper.pptx
@@ -6213,7 +6213,11 @@
           <a:bodyPr/>
           <a:lstStyle/>
           <a:p>
-            <a:endParaRPr lang="en-US"/>
+            <a:r>
+              <a:rPr lang="en-US" dirty="0" smtClean="0"/>
+              <a:t>White Paper vs Academic/Research Paper?</a:t>
+            </a:r>
+            <a:endParaRPr lang="en-US" dirty="0"/>
           </a:p>
         </p:txBody>
       </p:sp>
@@ -6227,12 +6231,95 @@
             <p:ph idx="1"/>
           </p:nvPr>
         </p:nvSpPr>
-        <p:spPr/>
-        <p:txBody>
-          <a:bodyPr/>
+        <p:spPr>
+          <a:xfrm>
+            <a:off x="1484310" y="2666999"/>
+            <a:ext cx="10018713" cy="3870961"/>
+          </a:xfrm>
+        </p:spPr>
+        <p:txBody>
+          <a:bodyPr>
+            <a:normAutofit fontScale="92500"/>
+          </a:bodyPr>
           <a:lstStyle/>
           <a:p>
-            <a:endParaRPr lang="en-US"/>
+            <a:r>
+              <a:rPr lang="en-US" dirty="0"/>
+              <a:t>A research paper, otherwise called a paper, is something you use to publish research in a </a:t>
+            </a:r>
+            <a:r>
+              <a:rPr lang="en-US" dirty="0" smtClean="0"/>
+              <a:t>journal</a:t>
+            </a:r>
+          </a:p>
+          <a:p>
+            <a:pPr lvl="1"/>
+            <a:r>
+              <a:rPr lang="en-US" dirty="0"/>
+              <a:t>It gets peer-reviewed and either accepted or </a:t>
+            </a:r>
+            <a:r>
+              <a:rPr lang="en-US" dirty="0" smtClean="0"/>
+              <a:t>rejected</a:t>
+            </a:r>
+          </a:p>
+          <a:p>
+            <a:pPr lvl="1"/>
+            <a:r>
+              <a:rPr lang="en-US" dirty="0"/>
+              <a:t>It usually costs money to publish, because </a:t>
+            </a:r>
+            <a:r>
+              <a:rPr lang="en-US" dirty="0" smtClean="0"/>
+              <a:t>journals</a:t>
+            </a:r>
+          </a:p>
+          <a:p>
+            <a:r>
+              <a:rPr lang="en-US" dirty="0"/>
+              <a:t>"White paper" is largely a nonsense business term, referring to a long document used for sales and marketing. It also means a government policy document</a:t>
+            </a:r>
+            <a:r>
+              <a:rPr lang="en-US" dirty="0" smtClean="0"/>
+              <a:t>.</a:t>
+            </a:r>
+          </a:p>
+          <a:p>
+            <a:pPr lvl="1"/>
+            <a:r>
+              <a:rPr lang="en-US" dirty="0"/>
+              <a:t>A white paper is common in government and is not really important</a:t>
+            </a:r>
+            <a:r>
+              <a:rPr lang="en-US" dirty="0" smtClean="0"/>
+              <a:t>.</a:t>
+            </a:r>
+          </a:p>
+          <a:p>
+            <a:r>
+              <a:rPr lang="en-US" dirty="0" err="1" smtClean="0"/>
+              <a:t>Quora</a:t>
+            </a:r>
+            <a:r>
+              <a:rPr lang="en-US" smtClean="0"/>
+              <a:t> Discussion:</a:t>
+            </a:r>
+            <a:endParaRPr lang="en-US" dirty="0" smtClean="0"/>
+          </a:p>
+          <a:p>
+            <a:r>
+              <a:rPr lang="en-US" dirty="0"/>
+              <a:t>https://</a:t>
+            </a:r>
+            <a:r>
+              <a:rPr lang="en-US" dirty="0" err="1"/>
+              <a:t>www.quora.com</a:t>
+            </a:r>
+            <a:r>
+              <a:rPr lang="en-US" dirty="0"/>
+              <a:t>/What-is-a-research-paper-vs-a-white-paper</a:t>
+            </a:r>
+            <a:endParaRPr lang="en-US" dirty="0"/>
           </a:p>
         </p:txBody>
       </p:sp>

</xml_diff>